<commit_message>
add code for miscro service
</commit_message>
<xml_diff>
--- a/微服务文档/bwic微服务架构v2.pptx
+++ b/微服务文档/bwic微服务架构v2.pptx
@@ -5,19 +5,20 @@
     <p:sldMasterId id="2147483648" r:id="rId1"/>
   </p:sldMasterIdLst>
   <p:notesMasterIdLst>
-    <p:notesMasterId r:id="rId7"/>
+    <p:notesMasterId r:id="rId8"/>
   </p:notesMasterIdLst>
   <p:sldIdLst>
-    <p:sldId id="268" r:id="rId2"/>
+    <p:sldId id="269" r:id="rId2"/>
     <p:sldId id="259" r:id="rId3"/>
     <p:sldId id="267" r:id="rId4"/>
     <p:sldId id="262" r:id="rId5"/>
     <p:sldId id="258" r:id="rId6"/>
+    <p:sldId id="268" r:id="rId7"/>
   </p:sldIdLst>
   <p:sldSz cx="12192000" cy="6858000"/>
   <p:notesSz cx="6858000" cy="9144000"/>
   <p:custDataLst>
-    <p:tags r:id="rId8"/>
+    <p:tags r:id="rId9"/>
   </p:custDataLst>
   <p:defaultTextStyle>
     <a:defPPr>
@@ -490,7 +491,13 @@
   <p:cSld>
     <p:spTree>
       <p:nvGrpSpPr>
-        <p:cNvPr id="1" name=""/>
+        <p:cNvPr id="1" name="">
+          <a:extLst>
+            <a:ext uri="{FF2B5EF4-FFF2-40B4-BE49-F238E27FC236}">
+              <a16:creationId xmlns:a16="http://schemas.microsoft.com/office/drawing/2014/main" id="{9F27DE38-E5CA-EE39-9F24-F896B06402E4}"/>
+            </a:ext>
+          </a:extLst>
+        </p:cNvPr>
         <p:cNvGrpSpPr/>
         <p:nvPr/>
       </p:nvGrpSpPr>
@@ -504,7 +511,13 @@
       </p:grpSpPr>
       <p:sp>
         <p:nvSpPr>
-          <p:cNvPr id="2" name="Slide Image Placeholder 1"/>
+          <p:cNvPr id="2" name="Slide Image Placeholder 1">
+            <a:extLst>
+              <a:ext uri="{FF2B5EF4-FFF2-40B4-BE49-F238E27FC236}">
+                <a16:creationId xmlns:a16="http://schemas.microsoft.com/office/drawing/2014/main" id="{93FAB650-F26D-23C4-F976-3474B2DB03A6}"/>
+              </a:ext>
+            </a:extLst>
+          </p:cNvPr>
           <p:cNvSpPr>
             <a:spLocks noGrp="1" noRot="1" noChangeAspect="1"/>
           </p:cNvSpPr>
@@ -516,7 +529,13 @@
       </p:sp>
       <p:sp>
         <p:nvSpPr>
-          <p:cNvPr id="3" name="Notes Placeholder 2"/>
+          <p:cNvPr id="3" name="Notes Placeholder 2">
+            <a:extLst>
+              <a:ext uri="{FF2B5EF4-FFF2-40B4-BE49-F238E27FC236}">
+                <a16:creationId xmlns:a16="http://schemas.microsoft.com/office/drawing/2014/main" id="{88D6D0BA-0150-C4B8-52F8-43C7B048092C}"/>
+              </a:ext>
+            </a:extLst>
+          </p:cNvPr>
           <p:cNvSpPr>
             <a:spLocks noGrp="1"/>
           </p:cNvSpPr>
@@ -539,7 +558,13 @@
       </p:sp>
       <p:sp>
         <p:nvSpPr>
-          <p:cNvPr id="4" name="Slide Number Placeholder 3"/>
+          <p:cNvPr id="4" name="Slide Number Placeholder 3">
+            <a:extLst>
+              <a:ext uri="{FF2B5EF4-FFF2-40B4-BE49-F238E27FC236}">
+                <a16:creationId xmlns:a16="http://schemas.microsoft.com/office/drawing/2014/main" id="{0911D53A-C464-B6B7-41F7-9F8409A241B4}"/>
+              </a:ext>
+            </a:extLst>
+          </p:cNvPr>
           <p:cNvSpPr>
             <a:spLocks noGrp="1"/>
           </p:cNvSpPr>
@@ -623,7 +648,7 @@
     </p:spTree>
     <p:extLst>
       <p:ext uri="{BB962C8B-B14F-4D97-AF65-F5344CB8AC3E}">
-        <p14:creationId xmlns:p14="http://schemas.microsoft.com/office/powerpoint/2010/main" val="2160806909"/>
+        <p14:creationId xmlns:p14="http://schemas.microsoft.com/office/powerpoint/2010/main" val="2718628446"/>
       </p:ext>
     </p:extLst>
   </p:cSld>
@@ -1353,6 +1378,150 @@
     <p:extLst>
       <p:ext uri="{BB962C8B-B14F-4D97-AF65-F5344CB8AC3E}">
         <p14:creationId xmlns:p14="http://schemas.microsoft.com/office/powerpoint/2010/main" val="3966207584"/>
+      </p:ext>
+    </p:extLst>
+  </p:cSld>
+  <p:clrMapOvr>
+    <a:masterClrMapping/>
+  </p:clrMapOvr>
+</p:notes>
+</file>
+
+<file path=ppt/notesSlides/notesSlide6.xml><?xml version="1.0" encoding="utf-8"?>
+<p:notes xmlns:a="http://schemas.openxmlformats.org/drawingml/2006/main" xmlns:r="http://schemas.openxmlformats.org/officeDocument/2006/relationships" xmlns:p="http://schemas.openxmlformats.org/presentationml/2006/main">
+  <p:cSld>
+    <p:spTree>
+      <p:nvGrpSpPr>
+        <p:cNvPr id="1" name=""/>
+        <p:cNvGrpSpPr/>
+        <p:nvPr/>
+      </p:nvGrpSpPr>
+      <p:grpSpPr>
+        <a:xfrm>
+          <a:off x="0" y="0"/>
+          <a:ext cx="0" cy="0"/>
+          <a:chOff x="0" y="0"/>
+          <a:chExt cx="0" cy="0"/>
+        </a:xfrm>
+      </p:grpSpPr>
+      <p:sp>
+        <p:nvSpPr>
+          <p:cNvPr id="2" name="Slide Image Placeholder 1"/>
+          <p:cNvSpPr>
+            <a:spLocks noGrp="1" noRot="1" noChangeAspect="1"/>
+          </p:cNvSpPr>
+          <p:nvPr>
+            <p:ph type="sldImg"/>
+          </p:nvPr>
+        </p:nvSpPr>
+        <p:spPr/>
+      </p:sp>
+      <p:sp>
+        <p:nvSpPr>
+          <p:cNvPr id="3" name="Notes Placeholder 2"/>
+          <p:cNvSpPr>
+            <a:spLocks noGrp="1"/>
+          </p:cNvSpPr>
+          <p:nvPr>
+            <p:ph type="body" idx="1"/>
+          </p:nvPr>
+        </p:nvSpPr>
+        <p:spPr/>
+        <p:txBody>
+          <a:bodyPr/>
+          <a:lstStyle/>
+          <a:p>
+            <a:endParaRPr lang="en-US" dirty="0"/>
+          </a:p>
+        </p:txBody>
+      </p:sp>
+      <p:sp>
+        <p:nvSpPr>
+          <p:cNvPr id="4" name="Slide Number Placeholder 3"/>
+          <p:cNvSpPr>
+            <a:spLocks noGrp="1"/>
+          </p:cNvSpPr>
+          <p:nvPr>
+            <p:ph type="sldNum" sz="quarter" idx="10"/>
+          </p:nvPr>
+        </p:nvSpPr>
+        <p:spPr/>
+        <p:txBody>
+          <a:bodyPr/>
+          <a:lstStyle/>
+          <a:p>
+            <a:pPr marL="0" marR="0" lvl="0" indent="0" algn="r" defTabSz="914400" rtl="0" eaLnBrk="1" fontAlgn="auto" latinLnBrk="0" hangingPunct="1">
+              <a:lnSpc>
+                <a:spcPct val="100000"/>
+              </a:lnSpc>
+              <a:spcBef>
+                <a:spcPts val="0"/>
+              </a:spcBef>
+              <a:spcAft>
+                <a:spcPts val="0"/>
+              </a:spcAft>
+              <a:buClrTx/>
+              <a:buSzTx/>
+              <a:buFontTx/>
+              <a:buNone/>
+              <a:tabLst/>
+              <a:defRPr/>
+            </a:pPr>
+            <a:fld id="{078470BC-4D67-4A4A-9E28-4459E070DDDD}" type="slidenum">
+              <a:rPr kumimoji="0" lang="en-US" sz="1200" b="0" i="0" u="none" strike="noStrike" kern="1200" cap="none" spc="0" normalizeH="0" baseline="0" noProof="0" smtClean="0">
+                <a:ln>
+                  <a:noFill/>
+                </a:ln>
+                <a:solidFill>
+                  <a:prstClr val="black"/>
+                </a:solidFill>
+                <a:effectLst/>
+                <a:uLnTx/>
+                <a:uFillTx/>
+                <a:latin typeface="Calibri" panose="020F0502020204030204"/>
+                <a:ea typeface="+mn-ea"/>
+                <a:cs typeface="+mn-cs"/>
+              </a:rPr>
+              <a:pPr marL="0" marR="0" lvl="0" indent="0" algn="r" defTabSz="914400" rtl="0" eaLnBrk="1" fontAlgn="auto" latinLnBrk="0" hangingPunct="1">
+                <a:lnSpc>
+                  <a:spcPct val="100000"/>
+                </a:lnSpc>
+                <a:spcBef>
+                  <a:spcPts val="0"/>
+                </a:spcBef>
+                <a:spcAft>
+                  <a:spcPts val="0"/>
+                </a:spcAft>
+                <a:buClrTx/>
+                <a:buSzTx/>
+                <a:buFontTx/>
+                <a:buNone/>
+                <a:tabLst/>
+                <a:defRPr/>
+              </a:pPr>
+              <a:t>6</a:t>
+            </a:fld>
+            <a:endParaRPr kumimoji="0" lang="en-US" sz="1200" b="0" i="0" u="none" strike="noStrike" kern="1200" cap="none" spc="0" normalizeH="0" baseline="0" noProof="0">
+              <a:ln>
+                <a:noFill/>
+              </a:ln>
+              <a:solidFill>
+                <a:prstClr val="black"/>
+              </a:solidFill>
+              <a:effectLst/>
+              <a:uLnTx/>
+              <a:uFillTx/>
+              <a:latin typeface="Calibri" panose="020F0502020204030204"/>
+              <a:ea typeface="+mn-ea"/>
+              <a:cs typeface="+mn-cs"/>
+            </a:endParaRPr>
+          </a:p>
+        </p:txBody>
+      </p:sp>
+    </p:spTree>
+    <p:extLst>
+      <p:ext uri="{BB962C8B-B14F-4D97-AF65-F5344CB8AC3E}">
+        <p14:creationId xmlns:p14="http://schemas.microsoft.com/office/powerpoint/2010/main" val="2160806909"/>
       </p:ext>
     </p:extLst>
   </p:cSld>
@@ -4278,7 +4447,13 @@
   <p:cSld>
     <p:spTree>
       <p:nvGrpSpPr>
-        <p:cNvPr id="1" name=""/>
+        <p:cNvPr id="1" name="">
+          <a:extLst>
+            <a:ext uri="{FF2B5EF4-FFF2-40B4-BE49-F238E27FC236}">
+              <a16:creationId xmlns:a16="http://schemas.microsoft.com/office/drawing/2014/main" id="{D549D2DB-1EBA-1AC6-2279-3354DEAAEF6F}"/>
+            </a:ext>
+          </a:extLst>
+        </p:cNvPr>
         <p:cNvGrpSpPr/>
         <p:nvPr/>
       </p:nvGrpSpPr>
@@ -4292,7 +4467,13 @@
       </p:grpSpPr>
       <p:pic>
         <p:nvPicPr>
-          <p:cNvPr id="28677" name="Picture 17"/>
+          <p:cNvPr id="28677" name="Picture 17">
+            <a:extLst>
+              <a:ext uri="{FF2B5EF4-FFF2-40B4-BE49-F238E27FC236}">
+                <a16:creationId xmlns:a16="http://schemas.microsoft.com/office/drawing/2014/main" id="{8008DD45-896C-FD19-C2A1-FF3CEA92F65A}"/>
+              </a:ext>
+            </a:extLst>
+          </p:cNvPr>
           <p:cNvPicPr>
             <a:picLocks noChangeAspect="1"/>
           </p:cNvPicPr>
@@ -4346,7 +4527,13 @@
       </p:pic>
       <p:grpSp>
         <p:nvGrpSpPr>
-          <p:cNvPr id="28678" name="Group 1"/>
+          <p:cNvPr id="28678" name="Group 1">
+            <a:extLst>
+              <a:ext uri="{FF2B5EF4-FFF2-40B4-BE49-F238E27FC236}">
+                <a16:creationId xmlns:a16="http://schemas.microsoft.com/office/drawing/2014/main" id="{6F12FBB6-53BD-195A-18C3-7B09FC57CA8C}"/>
+              </a:ext>
+            </a:extLst>
+          </p:cNvPr>
           <p:cNvGrpSpPr>
             <a:grpSpLocks/>
           </p:cNvGrpSpPr>
@@ -4362,7 +4549,13 @@
         </p:grpSpPr>
         <p:sp>
           <p:nvSpPr>
-            <p:cNvPr id="10" name="Oval 9"/>
+            <p:cNvPr id="10" name="Oval 9">
+              <a:extLst>
+                <a:ext uri="{FF2B5EF4-FFF2-40B4-BE49-F238E27FC236}">
+                  <a16:creationId xmlns:a16="http://schemas.microsoft.com/office/drawing/2014/main" id="{37A098DB-7537-E4CF-8C79-DC69C6352E65}"/>
+                </a:ext>
+              </a:extLst>
+            </p:cNvPr>
             <p:cNvSpPr/>
             <p:nvPr/>
           </p:nvSpPr>
@@ -4437,7 +4630,13 @@
         </p:sp>
         <p:sp>
           <p:nvSpPr>
-            <p:cNvPr id="28680" name="Rectangle 10"/>
+            <p:cNvPr id="28680" name="Rectangle 10">
+              <a:extLst>
+                <a:ext uri="{FF2B5EF4-FFF2-40B4-BE49-F238E27FC236}">
+                  <a16:creationId xmlns:a16="http://schemas.microsoft.com/office/drawing/2014/main" id="{9F656BE3-353B-0F18-EADC-C03305EF993E}"/>
+                </a:ext>
+              </a:extLst>
+            </p:cNvPr>
             <p:cNvSpPr>
               <a:spLocks noChangeArrowheads="1"/>
             </p:cNvSpPr>
@@ -4632,7 +4831,13 @@
       </p:grpSp>
       <p:sp>
         <p:nvSpPr>
-          <p:cNvPr id="12" name="Rectangle 11"/>
+          <p:cNvPr id="12" name="Rectangle 11">
+            <a:extLst>
+              <a:ext uri="{FF2B5EF4-FFF2-40B4-BE49-F238E27FC236}">
+                <a16:creationId xmlns:a16="http://schemas.microsoft.com/office/drawing/2014/main" id="{E8E7E38A-DFD1-6370-AD45-AEF5ECCE196E}"/>
+              </a:ext>
+            </a:extLst>
+          </p:cNvPr>
           <p:cNvSpPr/>
           <p:nvPr/>
         </p:nvSpPr>
@@ -4707,7 +4912,13 @@
       </p:sp>
       <p:sp>
         <p:nvSpPr>
-          <p:cNvPr id="13" name="Rectangle 12"/>
+          <p:cNvPr id="13" name="Rectangle 12">
+            <a:extLst>
+              <a:ext uri="{FF2B5EF4-FFF2-40B4-BE49-F238E27FC236}">
+                <a16:creationId xmlns:a16="http://schemas.microsoft.com/office/drawing/2014/main" id="{7DFBAA81-0064-F243-88A8-7246784C604E}"/>
+              </a:ext>
+            </a:extLst>
+          </p:cNvPr>
           <p:cNvSpPr/>
           <p:nvPr/>
         </p:nvSpPr>
@@ -4830,21 +5041,15 @@
               <a:defRPr/>
             </a:pPr>
             <a:r>
-              <a:rPr kumimoji="0" lang="zh-CN" altLang="en-US" sz="1800" b="0" i="0" u="none" strike="noStrike" kern="1200" cap="none" spc="0" normalizeH="0" baseline="0" noProof="0" dirty="0">
-                <a:ln>
-                  <a:noFill/>
-                </a:ln>
+              <a:rPr lang="zh-CN" altLang="en-US" dirty="0">
                 <a:solidFill>
                   <a:prstClr val="white"/>
                 </a:solidFill>
-                <a:effectLst/>
-                <a:uLnTx/>
-                <a:uFillTx/>
                 <a:latin typeface="Arial"/>
                 <a:ea typeface="Helvetica Light" charset="0"/>
                 <a:cs typeface="Helvetica Light" charset="0"/>
               </a:rPr>
-              <a:t>需求分析</a:t>
+              <a:t>开发流程</a:t>
             </a:r>
             <a:endParaRPr kumimoji="0" lang="en-US" sz="1800" b="0" i="0" u="none" strike="noStrike" kern="1200" cap="none" spc="0" normalizeH="0" baseline="0" noProof="0" dirty="0">
               <a:ln>
@@ -4865,7 +5070,13 @@
       </p:sp>
       <p:pic>
         <p:nvPicPr>
-          <p:cNvPr id="2" name="图片 1"/>
+          <p:cNvPr id="2" name="图片 1">
+            <a:extLst>
+              <a:ext uri="{FF2B5EF4-FFF2-40B4-BE49-F238E27FC236}">
+                <a16:creationId xmlns:a16="http://schemas.microsoft.com/office/drawing/2014/main" id="{AEB3AC96-7DB8-ADA9-0705-49F95F4C1A54}"/>
+              </a:ext>
+            </a:extLst>
+          </p:cNvPr>
           <p:cNvPicPr>
             <a:picLocks noChangeAspect="1"/>
           </p:cNvPicPr>
@@ -4890,7 +5101,7 @@
     </p:spTree>
     <p:extLst>
       <p:ext uri="{BB962C8B-B14F-4D97-AF65-F5344CB8AC3E}">
-        <p14:creationId xmlns:p14="http://schemas.microsoft.com/office/powerpoint/2010/main" val="2111485668"/>
+        <p14:creationId xmlns:p14="http://schemas.microsoft.com/office/powerpoint/2010/main" val="506891461"/>
       </p:ext>
     </p:extLst>
   </p:cSld>
@@ -9403,6 +9614,663 @@
     <p:extLst>
       <p:ext uri="{BB962C8B-B14F-4D97-AF65-F5344CB8AC3E}">
         <p14:creationId xmlns:p14="http://schemas.microsoft.com/office/powerpoint/2010/main" val="899199310"/>
+      </p:ext>
+    </p:extLst>
+  </p:cSld>
+  <p:clrMapOvr>
+    <a:masterClrMapping/>
+  </p:clrMapOvr>
+</p:sld>
+</file>
+
+<file path=ppt/slides/slide6.xml><?xml version="1.0" encoding="utf-8"?>
+<p:sld xmlns:a="http://schemas.openxmlformats.org/drawingml/2006/main" xmlns:r="http://schemas.openxmlformats.org/officeDocument/2006/relationships" xmlns:p="http://schemas.openxmlformats.org/presentationml/2006/main">
+  <p:cSld>
+    <p:spTree>
+      <p:nvGrpSpPr>
+        <p:cNvPr id="1" name=""/>
+        <p:cNvGrpSpPr/>
+        <p:nvPr/>
+      </p:nvGrpSpPr>
+      <p:grpSpPr>
+        <a:xfrm>
+          <a:off x="0" y="0"/>
+          <a:ext cx="0" cy="0"/>
+          <a:chOff x="0" y="0"/>
+          <a:chExt cx="0" cy="0"/>
+        </a:xfrm>
+      </p:grpSpPr>
+      <p:pic>
+        <p:nvPicPr>
+          <p:cNvPr id="28677" name="Picture 17"/>
+          <p:cNvPicPr>
+            <a:picLocks noChangeAspect="1"/>
+          </p:cNvPicPr>
+          <p:nvPr/>
+        </p:nvPicPr>
+        <p:blipFill>
+          <a:blip r:embed="rId3" cstate="email">
+            <a:extLst>
+              <a:ext uri="{28A0092B-C50C-407E-A947-70E740481C1C}">
+                <a14:useLocalDpi xmlns:a14="http://schemas.microsoft.com/office/drawing/2010/main"/>
+              </a:ext>
+            </a:extLst>
+          </a:blip>
+          <a:srcRect/>
+          <a:stretch>
+            <a:fillRect/>
+          </a:stretch>
+        </p:blipFill>
+        <p:spPr bwMode="auto">
+          <a:xfrm>
+            <a:off x="2285772" y="5199063"/>
+            <a:ext cx="669925" cy="436562"/>
+          </a:xfrm>
+          <a:prstGeom prst="rect">
+            <a:avLst/>
+          </a:prstGeom>
+          <a:noFill/>
+          <a:ln>
+            <a:noFill/>
+          </a:ln>
+          <a:extLst>
+            <a:ext uri="{909E8E84-426E-40DD-AFC4-6F175D3DCCD1}">
+              <a14:hiddenFill xmlns:a14="http://schemas.microsoft.com/office/drawing/2010/main">
+                <a:solidFill>
+                  <a:srgbClr val="FFFFFF"/>
+                </a:solidFill>
+              </a14:hiddenFill>
+            </a:ext>
+            <a:ext uri="{91240B29-F687-4F45-9708-019B960494DF}">
+              <a14:hiddenLine xmlns:a14="http://schemas.microsoft.com/office/drawing/2010/main" w="9525">
+                <a:solidFill>
+                  <a:srgbClr val="000000"/>
+                </a:solidFill>
+                <a:miter lim="800000"/>
+                <a:headEnd/>
+                <a:tailEnd/>
+              </a14:hiddenLine>
+            </a:ext>
+          </a:extLst>
+        </p:spPr>
+      </p:pic>
+      <p:grpSp>
+        <p:nvGrpSpPr>
+          <p:cNvPr id="28678" name="Group 1"/>
+          <p:cNvGrpSpPr>
+            <a:grpSpLocks/>
+          </p:cNvGrpSpPr>
+          <p:nvPr/>
+        </p:nvGrpSpPr>
+        <p:grpSpPr bwMode="auto">
+          <a:xfrm>
+            <a:off x="2451647" y="2511425"/>
+            <a:ext cx="241300" cy="241300"/>
+            <a:chOff x="1863950" y="2383780"/>
+            <a:chExt cx="322730" cy="322730"/>
+          </a:xfrm>
+        </p:grpSpPr>
+        <p:sp>
+          <p:nvSpPr>
+            <p:cNvPr id="10" name="Oval 9"/>
+            <p:cNvSpPr/>
+            <p:nvPr/>
+          </p:nvSpPr>
+          <p:spPr>
+            <a:xfrm>
+              <a:off x="1863950" y="2383780"/>
+              <a:ext cx="322730" cy="322730"/>
+            </a:xfrm>
+            <a:prstGeom prst="ellipse">
+              <a:avLst/>
+            </a:prstGeom>
+            <a:solidFill>
+              <a:srgbClr val="004784"/>
+            </a:solidFill>
+            <a:ln>
+              <a:noFill/>
+            </a:ln>
+          </p:spPr>
+          <p:style>
+            <a:lnRef idx="2">
+              <a:schemeClr val="accent1">
+                <a:shade val="50000"/>
+              </a:schemeClr>
+            </a:lnRef>
+            <a:fillRef idx="1">
+              <a:schemeClr val="accent1"/>
+            </a:fillRef>
+            <a:effectRef idx="0">
+              <a:schemeClr val="accent1"/>
+            </a:effectRef>
+            <a:fontRef idx="minor">
+              <a:schemeClr val="lt1"/>
+            </a:fontRef>
+          </p:style>
+          <p:txBody>
+            <a:bodyPr anchor="ctr"/>
+            <a:lstStyle/>
+            <a:p>
+              <a:pPr marL="0" marR="0" lvl="0" indent="0" algn="ctr" defTabSz="914400" rtl="0" eaLnBrk="1" fontAlgn="auto" latinLnBrk="0" hangingPunct="1">
+                <a:lnSpc>
+                  <a:spcPct val="100000"/>
+                </a:lnSpc>
+                <a:spcBef>
+                  <a:spcPts val="0"/>
+                </a:spcBef>
+                <a:spcAft>
+                  <a:spcPts val="0"/>
+                </a:spcAft>
+                <a:buClrTx/>
+                <a:buSzTx/>
+                <a:buFontTx/>
+                <a:buNone/>
+                <a:tabLst/>
+                <a:defRPr/>
+              </a:pPr>
+              <a:endParaRPr kumimoji="0" lang="en-US" sz="1350" b="0" i="0" u="none" strike="noStrike" kern="1200" cap="none" spc="0" normalizeH="0" baseline="0" noProof="0">
+                <a:ln>
+                  <a:noFill/>
+                </a:ln>
+                <a:solidFill>
+                  <a:prstClr val="white"/>
+                </a:solidFill>
+                <a:effectLst/>
+                <a:uLnTx/>
+                <a:uFillTx/>
+                <a:latin typeface="Arial"/>
+                <a:ea typeface="微软雅黑"/>
+                <a:cs typeface="+mn-cs"/>
+              </a:endParaRPr>
+            </a:p>
+          </p:txBody>
+        </p:sp>
+        <p:sp>
+          <p:nvSpPr>
+            <p:cNvPr id="28680" name="Rectangle 10"/>
+            <p:cNvSpPr>
+              <a:spLocks noChangeArrowheads="1"/>
+            </p:cNvSpPr>
+            <p:nvPr/>
+          </p:nvSpPr>
+          <p:spPr bwMode="auto">
+            <a:xfrm>
+              <a:off x="1922921" y="2393995"/>
+              <a:ext cx="204790" cy="307775"/>
+            </a:xfrm>
+            <a:prstGeom prst="rect">
+              <a:avLst/>
+            </a:prstGeom>
+            <a:noFill/>
+            <a:ln>
+              <a:noFill/>
+            </a:ln>
+            <a:extLst>
+              <a:ext uri="{909E8E84-426E-40DD-AFC4-6F175D3DCCD1}">
+                <a14:hiddenFill xmlns:a14="http://schemas.microsoft.com/office/drawing/2010/main">
+                  <a:solidFill>
+                    <a:srgbClr val="FFFFFF"/>
+                  </a:solidFill>
+                </a14:hiddenFill>
+              </a:ext>
+              <a:ext uri="{91240B29-F687-4F45-9708-019B960494DF}">
+                <a14:hiddenLine xmlns:a14="http://schemas.microsoft.com/office/drawing/2010/main" w="9525">
+                  <a:solidFill>
+                    <a:srgbClr val="000000"/>
+                  </a:solidFill>
+                  <a:miter lim="800000"/>
+                  <a:headEnd/>
+                  <a:tailEnd/>
+                </a14:hiddenLine>
+              </a:ext>
+            </a:extLst>
+          </p:spPr>
+          <p:txBody>
+            <a:bodyPr anchor="ctr">
+              <a:spAutoFit/>
+            </a:bodyPr>
+            <a:lstStyle>
+              <a:lvl1pPr>
+                <a:defRPr>
+                  <a:solidFill>
+                    <a:schemeClr val="tx1"/>
+                  </a:solidFill>
+                  <a:latin typeface="Calibri" charset="0"/>
+                </a:defRPr>
+              </a:lvl1pPr>
+              <a:lvl2pPr marL="742950" indent="-285750">
+                <a:defRPr>
+                  <a:solidFill>
+                    <a:schemeClr val="tx1"/>
+                  </a:solidFill>
+                  <a:latin typeface="Calibri" charset="0"/>
+                </a:defRPr>
+              </a:lvl2pPr>
+              <a:lvl3pPr marL="1143000" indent="-228600">
+                <a:defRPr>
+                  <a:solidFill>
+                    <a:schemeClr val="tx1"/>
+                  </a:solidFill>
+                  <a:latin typeface="Calibri" charset="0"/>
+                </a:defRPr>
+              </a:lvl3pPr>
+              <a:lvl4pPr marL="1600200" indent="-228600">
+                <a:defRPr>
+                  <a:solidFill>
+                    <a:schemeClr val="tx1"/>
+                  </a:solidFill>
+                  <a:latin typeface="Calibri" charset="0"/>
+                </a:defRPr>
+              </a:lvl4pPr>
+              <a:lvl5pPr marL="2057400" indent="-228600">
+                <a:defRPr>
+                  <a:solidFill>
+                    <a:schemeClr val="tx1"/>
+                  </a:solidFill>
+                  <a:latin typeface="Calibri" charset="0"/>
+                </a:defRPr>
+              </a:lvl5pPr>
+              <a:lvl6pPr marL="2514600" indent="-228600" fontAlgn="base">
+                <a:spcBef>
+                  <a:spcPct val="0"/>
+                </a:spcBef>
+                <a:spcAft>
+                  <a:spcPct val="0"/>
+                </a:spcAft>
+                <a:defRPr>
+                  <a:solidFill>
+                    <a:schemeClr val="tx1"/>
+                  </a:solidFill>
+                  <a:latin typeface="Calibri" charset="0"/>
+                </a:defRPr>
+              </a:lvl6pPr>
+              <a:lvl7pPr marL="2971800" indent="-228600" fontAlgn="base">
+                <a:spcBef>
+                  <a:spcPct val="0"/>
+                </a:spcBef>
+                <a:spcAft>
+                  <a:spcPct val="0"/>
+                </a:spcAft>
+                <a:defRPr>
+                  <a:solidFill>
+                    <a:schemeClr val="tx1"/>
+                  </a:solidFill>
+                  <a:latin typeface="Calibri" charset="0"/>
+                </a:defRPr>
+              </a:lvl7pPr>
+              <a:lvl8pPr marL="3429000" indent="-228600" fontAlgn="base">
+                <a:spcBef>
+                  <a:spcPct val="0"/>
+                </a:spcBef>
+                <a:spcAft>
+                  <a:spcPct val="0"/>
+                </a:spcAft>
+                <a:defRPr>
+                  <a:solidFill>
+                    <a:schemeClr val="tx1"/>
+                  </a:solidFill>
+                  <a:latin typeface="Calibri" charset="0"/>
+                </a:defRPr>
+              </a:lvl8pPr>
+              <a:lvl9pPr marL="3886200" indent="-228600" fontAlgn="base">
+                <a:spcBef>
+                  <a:spcPct val="0"/>
+                </a:spcBef>
+                <a:spcAft>
+                  <a:spcPct val="0"/>
+                </a:spcAft>
+                <a:defRPr>
+                  <a:solidFill>
+                    <a:schemeClr val="tx1"/>
+                  </a:solidFill>
+                  <a:latin typeface="Calibri" charset="0"/>
+                </a:defRPr>
+              </a:lvl9pPr>
+            </a:lstStyle>
+            <a:p>
+              <a:pPr marL="0" marR="0" lvl="0" indent="0" algn="ctr" defTabSz="914400" rtl="0" eaLnBrk="1" fontAlgn="auto" latinLnBrk="0" hangingPunct="1">
+                <a:lnSpc>
+                  <a:spcPct val="100000"/>
+                </a:lnSpc>
+                <a:spcBef>
+                  <a:spcPts val="0"/>
+                </a:spcBef>
+                <a:spcAft>
+                  <a:spcPts val="0"/>
+                </a:spcAft>
+                <a:buClrTx/>
+                <a:buSzTx/>
+                <a:buFontTx/>
+                <a:buNone/>
+                <a:tabLst/>
+                <a:defRPr/>
+              </a:pPr>
+              <a:r>
+                <a:rPr kumimoji="0" lang="en-US" altLang="en-US" sz="900" b="1" i="0" u="none" strike="noStrike" kern="1200" cap="none" spc="0" normalizeH="0" baseline="0" noProof="0" dirty="0">
+                  <a:ln>
+                    <a:noFill/>
+                  </a:ln>
+                  <a:solidFill>
+                    <a:prstClr val="white"/>
+                  </a:solidFill>
+                  <a:effectLst/>
+                  <a:uLnTx/>
+                  <a:uFillTx/>
+                  <a:latin typeface="Helvetica" charset="0"/>
+                  <a:ea typeface="Helvetica" charset="0"/>
+                  <a:cs typeface="Helvetica" charset="0"/>
+                </a:rPr>
+                <a:t>1</a:t>
+              </a:r>
+              <a:endParaRPr kumimoji="0" lang="en-US" altLang="en-US" sz="900" b="0" i="0" u="none" strike="noStrike" kern="1200" cap="none" spc="0" normalizeH="0" baseline="0" noProof="0" dirty="0">
+                <a:ln>
+                  <a:noFill/>
+                </a:ln>
+                <a:solidFill>
+                  <a:prstClr val="white"/>
+                </a:solidFill>
+                <a:effectLst/>
+                <a:uLnTx/>
+                <a:uFillTx/>
+                <a:latin typeface="Helvetica Light" charset="0"/>
+                <a:ea typeface="Helvetica Light" charset="0"/>
+                <a:cs typeface="Helvetica Light" charset="0"/>
+              </a:endParaRPr>
+            </a:p>
+          </p:txBody>
+        </p:sp>
+      </p:grpSp>
+      <p:sp>
+        <p:nvSpPr>
+          <p:cNvPr id="12" name="Rectangle 11"/>
+          <p:cNvSpPr/>
+          <p:nvPr/>
+        </p:nvSpPr>
+        <p:spPr>
+          <a:xfrm>
+            <a:off x="1458686" y="-33136"/>
+            <a:ext cx="2086747" cy="6891136"/>
+          </a:xfrm>
+          <a:prstGeom prst="rect">
+            <a:avLst/>
+          </a:prstGeom>
+          <a:solidFill>
+            <a:srgbClr val="0094D1"/>
+          </a:solidFill>
+          <a:ln>
+            <a:noFill/>
+          </a:ln>
+        </p:spPr>
+        <p:style>
+          <a:lnRef idx="2">
+            <a:schemeClr val="accent1">
+              <a:shade val="50000"/>
+            </a:schemeClr>
+          </a:lnRef>
+          <a:fillRef idx="1">
+            <a:schemeClr val="accent1"/>
+          </a:fillRef>
+          <a:effectRef idx="0">
+            <a:schemeClr val="accent1"/>
+          </a:effectRef>
+          <a:fontRef idx="minor">
+            <a:schemeClr val="lt1"/>
+          </a:fontRef>
+        </p:style>
+        <p:txBody>
+          <a:bodyPr anchor="ctr"/>
+          <a:lstStyle/>
+          <a:p>
+            <a:pPr marL="0" marR="0" lvl="0" indent="0" algn="ctr" defTabSz="914400" rtl="0" eaLnBrk="1" fontAlgn="auto" latinLnBrk="0" hangingPunct="1">
+              <a:lnSpc>
+                <a:spcPct val="100000"/>
+              </a:lnSpc>
+              <a:spcBef>
+                <a:spcPts val="0"/>
+              </a:spcBef>
+              <a:spcAft>
+                <a:spcPts val="0"/>
+              </a:spcAft>
+              <a:buClrTx/>
+              <a:buSzTx/>
+              <a:buFontTx/>
+              <a:buNone/>
+              <a:tabLst/>
+              <a:defRPr/>
+            </a:pPr>
+            <a:endParaRPr kumimoji="0" lang="en-US" sz="1350" b="0" i="0" u="none" strike="noStrike" kern="1200" cap="none" spc="0" normalizeH="0" baseline="0" noProof="0">
+              <a:ln>
+                <a:noFill/>
+              </a:ln>
+              <a:solidFill>
+                <a:prstClr val="white"/>
+              </a:solidFill>
+              <a:effectLst/>
+              <a:uLnTx/>
+              <a:uFillTx/>
+              <a:latin typeface="Arial"/>
+              <a:ea typeface="微软雅黑"/>
+              <a:cs typeface="+mn-cs"/>
+            </a:endParaRPr>
+          </a:p>
+        </p:txBody>
+      </p:sp>
+      <p:sp>
+        <p:nvSpPr>
+          <p:cNvPr id="13" name="Rectangle 12"/>
+          <p:cNvSpPr/>
+          <p:nvPr/>
+        </p:nvSpPr>
+        <p:spPr>
+          <a:xfrm>
+            <a:off x="1708310" y="3158699"/>
+            <a:ext cx="1743075" cy="854080"/>
+          </a:xfrm>
+          <a:prstGeom prst="rect">
+            <a:avLst/>
+          </a:prstGeom>
+        </p:spPr>
+        <p:txBody>
+          <a:bodyPr anchor="ctr">
+            <a:spAutoFit/>
+          </a:bodyPr>
+          <a:lstStyle/>
+          <a:p>
+            <a:pPr marL="0" marR="0" lvl="0" indent="0" algn="ctr" defTabSz="914400" rtl="0" eaLnBrk="1" fontAlgn="auto" latinLnBrk="0" hangingPunct="1">
+              <a:lnSpc>
+                <a:spcPct val="100000"/>
+              </a:lnSpc>
+              <a:spcBef>
+                <a:spcPts val="0"/>
+              </a:spcBef>
+              <a:spcAft>
+                <a:spcPts val="0"/>
+              </a:spcAft>
+              <a:buClrTx/>
+              <a:buSzTx/>
+              <a:buFontTx/>
+              <a:buNone/>
+              <a:tabLst/>
+              <a:defRPr/>
+            </a:pPr>
+            <a:r>
+              <a:rPr kumimoji="0" lang="zh-CN" altLang="en-US" sz="1800" b="0" i="0" u="none" strike="noStrike" kern="1200" cap="none" spc="0" normalizeH="0" baseline="0" noProof="0" dirty="0">
+                <a:ln>
+                  <a:noFill/>
+                </a:ln>
+                <a:solidFill>
+                  <a:prstClr val="white"/>
+                </a:solidFill>
+                <a:effectLst/>
+                <a:uLnTx/>
+                <a:uFillTx/>
+                <a:latin typeface="Arial"/>
+                <a:ea typeface="Helvetica Light" charset="0"/>
+                <a:cs typeface="Helvetica Light" charset="0"/>
+              </a:rPr>
+              <a:t>项目实践</a:t>
+            </a:r>
+            <a:endParaRPr kumimoji="0" lang="en-US" sz="1800" b="0" i="0" u="none" strike="noStrike" kern="1200" cap="none" spc="0" normalizeH="0" baseline="0" noProof="0" dirty="0">
+              <a:ln>
+                <a:noFill/>
+              </a:ln>
+              <a:solidFill>
+                <a:prstClr val="white"/>
+              </a:solidFill>
+              <a:effectLst/>
+              <a:uLnTx/>
+              <a:uFillTx/>
+              <a:latin typeface="Arial"/>
+              <a:ea typeface="Helvetica Light" charset="0"/>
+              <a:cs typeface="Helvetica Light" charset="0"/>
+            </a:endParaRPr>
+          </a:p>
+          <a:p>
+            <a:pPr marL="0" marR="0" lvl="0" indent="0" algn="ctr" defTabSz="914400" rtl="0" eaLnBrk="1" fontAlgn="auto" latinLnBrk="0" hangingPunct="1">
+              <a:lnSpc>
+                <a:spcPct val="100000"/>
+              </a:lnSpc>
+              <a:spcBef>
+                <a:spcPts val="0"/>
+              </a:spcBef>
+              <a:spcAft>
+                <a:spcPts val="0"/>
+              </a:spcAft>
+              <a:buClrTx/>
+              <a:buSzTx/>
+              <a:buFontTx/>
+              <a:buNone/>
+              <a:tabLst/>
+              <a:defRPr/>
+            </a:pPr>
+            <a:r>
+              <a:rPr kumimoji="0" lang="en-US" sz="1350" b="0" i="0" u="none" strike="noStrike" kern="1200" cap="none" spc="0" normalizeH="0" baseline="0" noProof="0" dirty="0">
+                <a:ln>
+                  <a:noFill/>
+                </a:ln>
+                <a:solidFill>
+                  <a:prstClr val="white"/>
+                </a:solidFill>
+                <a:effectLst/>
+                <a:uLnTx/>
+                <a:uFillTx/>
+                <a:latin typeface="Arial"/>
+                <a:ea typeface="Helvetica Light" charset="0"/>
+                <a:cs typeface="Helvetica Light" charset="0"/>
+              </a:rPr>
+              <a:t>—————</a:t>
+            </a:r>
+          </a:p>
+          <a:p>
+            <a:pPr marL="0" marR="0" lvl="0" indent="0" algn="ctr" defTabSz="914400" rtl="0" eaLnBrk="1" fontAlgn="auto" latinLnBrk="0" hangingPunct="1">
+              <a:lnSpc>
+                <a:spcPct val="100000"/>
+              </a:lnSpc>
+              <a:spcBef>
+                <a:spcPts val="0"/>
+              </a:spcBef>
+              <a:spcAft>
+                <a:spcPts val="0"/>
+              </a:spcAft>
+              <a:buClrTx/>
+              <a:buSzTx/>
+              <a:buFontTx/>
+              <a:buNone/>
+              <a:tabLst/>
+              <a:defRPr/>
+            </a:pPr>
+            <a:r>
+              <a:rPr lang="zh-CN" altLang="en-US" dirty="0">
+                <a:solidFill>
+                  <a:prstClr val="white"/>
+                </a:solidFill>
+                <a:latin typeface="Arial"/>
+                <a:ea typeface="Helvetica Light" charset="0"/>
+                <a:cs typeface="Helvetica Light" charset="0"/>
+              </a:rPr>
+              <a:t>环境准备</a:t>
+            </a:r>
+            <a:endParaRPr kumimoji="0" lang="en-US" sz="1800" b="0" i="0" u="none" strike="noStrike" kern="1200" cap="none" spc="0" normalizeH="0" baseline="0" noProof="0" dirty="0">
+              <a:ln>
+                <a:noFill/>
+              </a:ln>
+              <a:solidFill>
+                <a:prstClr val="white"/>
+              </a:solidFill>
+              <a:effectLst/>
+              <a:uLnTx/>
+              <a:uFillTx/>
+              <a:latin typeface="Arial"/>
+              <a:ea typeface="Helvetica Light" charset="0"/>
+              <a:cs typeface="Helvetica Light" charset="0"/>
+            </a:endParaRPr>
+          </a:p>
+        </p:txBody>
+      </p:sp>
+      <p:sp>
+        <p:nvSpPr>
+          <p:cNvPr id="3" name="文本框 2">
+            <a:extLst>
+              <a:ext uri="{FF2B5EF4-FFF2-40B4-BE49-F238E27FC236}">
+                <a16:creationId xmlns:a16="http://schemas.microsoft.com/office/drawing/2014/main" id="{13BC3F65-465B-191F-C09D-52E4675BA3A3}"/>
+              </a:ext>
+            </a:extLst>
+          </p:cNvPr>
+          <p:cNvSpPr txBox="1"/>
+          <p:nvPr/>
+        </p:nvSpPr>
+        <p:spPr>
+          <a:xfrm>
+            <a:off x="5195636" y="2967335"/>
+            <a:ext cx="1223412" cy="923330"/>
+          </a:xfrm>
+          <a:prstGeom prst="rect">
+            <a:avLst/>
+          </a:prstGeom>
+          <a:noFill/>
+        </p:spPr>
+        <p:txBody>
+          <a:bodyPr wrap="none" rtlCol="0">
+            <a:spAutoFit/>
+          </a:bodyPr>
+          <a:lstStyle/>
+          <a:p>
+            <a:pPr marL="342900" indent="-342900">
+              <a:buFont typeface="+mj-lt"/>
+              <a:buAutoNum type="arabicPeriod"/>
+            </a:pPr>
+            <a:r>
+              <a:rPr lang="en-US" altLang="zh-CN" dirty="0"/>
+              <a:t>JDK</a:t>
+            </a:r>
+          </a:p>
+          <a:p>
+            <a:pPr marL="342900" indent="-342900">
+              <a:buFont typeface="+mj-lt"/>
+              <a:buAutoNum type="arabicPeriod"/>
+            </a:pPr>
+            <a:r>
+              <a:rPr lang="en-US" altLang="zh-CN" dirty="0"/>
+              <a:t>IDE</a:t>
+            </a:r>
+          </a:p>
+          <a:p>
+            <a:pPr marL="342900" indent="-342900">
+              <a:buFont typeface="+mj-lt"/>
+              <a:buAutoNum type="arabicPeriod"/>
+            </a:pPr>
+            <a:r>
+              <a:rPr lang="en-US" altLang="zh-CN" dirty="0"/>
+              <a:t>Maven</a:t>
+            </a:r>
+            <a:endParaRPr lang="zh-CN" altLang="en-US" dirty="0"/>
+          </a:p>
+        </p:txBody>
+      </p:sp>
+    </p:spTree>
+    <p:extLst>
+      <p:ext uri="{BB962C8B-B14F-4D97-AF65-F5344CB8AC3E}">
+        <p14:creationId xmlns:p14="http://schemas.microsoft.com/office/powerpoint/2010/main" val="2111485668"/>
       </p:ext>
     </p:extLst>
   </p:cSld>

</xml_diff>